<commit_message>
Risolti errori grammaticali e di battitura
</commit_message>
<xml_diff>
--- a/Presentazione_Booksnap.pptx
+++ b/Presentazione_Booksnap.pptx
@@ -109,6 +109,11 @@
       </a:defRPr>
     </a:lvl9pPr>
   </p:defaultTextStyle>
+  <p:extLst>
+    <p:ext uri="{EFAFB233-063F-42B5-8137-9DF3F51BA10A}">
+      <p15:sldGuideLst xmlns:p15="http://schemas.microsoft.com/office/powerpoint/2012/main"/>
+    </p:ext>
+  </p:extLst>
 </p:presentation>
 </file>
 
@@ -447,7 +452,7 @@
           <a:p>
             <a:fld id="{9B2DD450-BA30-CF41-84E1-EC9AFB48EBE4}" type="datetimeFigureOut">
               <a:rPr lang="it-IT" smtClean="0"/>
-              <a:t>16/12/23</a:t>
+              <a:t>22/12/23</a:t>
             </a:fld>
             <a:endParaRPr lang="it-IT" dirty="0"/>
           </a:p>
@@ -1535,7 +1540,7 @@
           <a:p>
             <a:fld id="{9B2DD450-BA30-CF41-84E1-EC9AFB48EBE4}" type="datetimeFigureOut">
               <a:rPr lang="it-IT" smtClean="0"/>
-              <a:t>16/12/23</a:t>
+              <a:t>22/12/23</a:t>
             </a:fld>
             <a:endParaRPr lang="it-IT" dirty="0"/>
           </a:p>
@@ -2515,7 +2520,7 @@
           <a:p>
             <a:fld id="{9B2DD450-BA30-CF41-84E1-EC9AFB48EBE4}" type="datetimeFigureOut">
               <a:rPr lang="it-IT" smtClean="0"/>
-              <a:t>16/12/23</a:t>
+              <a:t>22/12/23</a:t>
             </a:fld>
             <a:endParaRPr lang="it-IT" dirty="0"/>
           </a:p>
@@ -3649,7 +3654,7 @@
           <a:p>
             <a:fld id="{9B2DD450-BA30-CF41-84E1-EC9AFB48EBE4}" type="datetimeFigureOut">
               <a:rPr lang="it-IT" smtClean="0"/>
-              <a:t>16/12/23</a:t>
+              <a:t>22/12/23</a:t>
             </a:fld>
             <a:endParaRPr lang="it-IT" dirty="0"/>
           </a:p>
@@ -4682,7 +4687,7 @@
           <a:p>
             <a:fld id="{9B2DD450-BA30-CF41-84E1-EC9AFB48EBE4}" type="datetimeFigureOut">
               <a:rPr lang="it-IT" smtClean="0"/>
-              <a:t>16/12/23</a:t>
+              <a:t>22/12/23</a:t>
             </a:fld>
             <a:endParaRPr lang="it-IT" dirty="0"/>
           </a:p>
@@ -5342,7 +5347,7 @@
           <a:p>
             <a:fld id="{9B2DD450-BA30-CF41-84E1-EC9AFB48EBE4}" type="datetimeFigureOut">
               <a:rPr lang="it-IT" smtClean="0"/>
-              <a:t>16/12/23</a:t>
+              <a:t>22/12/23</a:t>
             </a:fld>
             <a:endParaRPr lang="it-IT" dirty="0"/>
           </a:p>
@@ -6203,7 +6208,7 @@
           <a:p>
             <a:fld id="{9B2DD450-BA30-CF41-84E1-EC9AFB48EBE4}" type="datetimeFigureOut">
               <a:rPr lang="it-IT" smtClean="0"/>
-              <a:t>16/12/23</a:t>
+              <a:t>22/12/23</a:t>
             </a:fld>
             <a:endParaRPr lang="it-IT" dirty="0"/>
           </a:p>
@@ -6393,7 +6398,7 @@
           <a:p>
             <a:fld id="{9B2DD450-BA30-CF41-84E1-EC9AFB48EBE4}" type="datetimeFigureOut">
               <a:rPr lang="it-IT" smtClean="0"/>
-              <a:t>16/12/23</a:t>
+              <a:t>22/12/23</a:t>
             </a:fld>
             <a:endParaRPr lang="it-IT" dirty="0"/>
           </a:p>
@@ -7365,7 +7370,7 @@
           <a:p>
             <a:fld id="{9B2DD450-BA30-CF41-84E1-EC9AFB48EBE4}" type="datetimeFigureOut">
               <a:rPr lang="it-IT" smtClean="0"/>
-              <a:t>16/12/23</a:t>
+              <a:t>22/12/23</a:t>
             </a:fld>
             <a:endParaRPr lang="it-IT" dirty="0"/>
           </a:p>
@@ -7576,7 +7581,7 @@
           <a:p>
             <a:fld id="{9B2DD450-BA30-CF41-84E1-EC9AFB48EBE4}" type="datetimeFigureOut">
               <a:rPr lang="it-IT" smtClean="0"/>
-              <a:t>16/12/23</a:t>
+              <a:t>22/12/23</a:t>
             </a:fld>
             <a:endParaRPr lang="it-IT" dirty="0"/>
           </a:p>
@@ -8610,7 +8615,7 @@
           <a:p>
             <a:fld id="{9B2DD450-BA30-CF41-84E1-EC9AFB48EBE4}" type="datetimeFigureOut">
               <a:rPr lang="it-IT" smtClean="0"/>
-              <a:t>16/12/23</a:t>
+              <a:t>22/12/23</a:t>
             </a:fld>
             <a:endParaRPr lang="it-IT" dirty="0"/>
           </a:p>
@@ -8882,7 +8887,7 @@
           <a:p>
             <a:fld id="{9B2DD450-BA30-CF41-84E1-EC9AFB48EBE4}" type="datetimeFigureOut">
               <a:rPr lang="it-IT" smtClean="0"/>
-              <a:t>16/12/23</a:t>
+              <a:t>22/12/23</a:t>
             </a:fld>
             <a:endParaRPr lang="it-IT" dirty="0"/>
           </a:p>
@@ -9292,7 +9297,7 @@
           <a:p>
             <a:fld id="{9B2DD450-BA30-CF41-84E1-EC9AFB48EBE4}" type="datetimeFigureOut">
               <a:rPr lang="it-IT" smtClean="0"/>
-              <a:t>16/12/23</a:t>
+              <a:t>22/12/23</a:t>
             </a:fld>
             <a:endParaRPr lang="it-IT" dirty="0"/>
           </a:p>
@@ -9419,7 +9424,7 @@
           <a:p>
             <a:fld id="{9B2DD450-BA30-CF41-84E1-EC9AFB48EBE4}" type="datetimeFigureOut">
               <a:rPr lang="it-IT" smtClean="0"/>
-              <a:t>16/12/23</a:t>
+              <a:t>22/12/23</a:t>
             </a:fld>
             <a:endParaRPr lang="it-IT" dirty="0"/>
           </a:p>
@@ -9514,7 +9519,7 @@
           <a:p>
             <a:fld id="{9B2DD450-BA30-CF41-84E1-EC9AFB48EBE4}" type="datetimeFigureOut">
               <a:rPr lang="it-IT" smtClean="0"/>
-              <a:t>16/12/23</a:t>
+              <a:t>22/12/23</a:t>
             </a:fld>
             <a:endParaRPr lang="it-IT" dirty="0"/>
           </a:p>
@@ -10595,7 +10600,7 @@
           <a:p>
             <a:fld id="{9B2DD450-BA30-CF41-84E1-EC9AFB48EBE4}" type="datetimeFigureOut">
               <a:rPr lang="it-IT" smtClean="0"/>
-              <a:t>16/12/23</a:t>
+              <a:t>22/12/23</a:t>
             </a:fld>
             <a:endParaRPr lang="it-IT" dirty="0"/>
           </a:p>
@@ -11703,7 +11708,7 @@
           <a:p>
             <a:fld id="{9B2DD450-BA30-CF41-84E1-EC9AFB48EBE4}" type="datetimeFigureOut">
               <a:rPr lang="it-IT" smtClean="0"/>
-              <a:t>16/12/23</a:t>
+              <a:t>22/12/23</a:t>
             </a:fld>
             <a:endParaRPr lang="it-IT" dirty="0"/>
           </a:p>
@@ -12700,7 +12705,7 @@
           <a:p>
             <a:fld id="{9B2DD450-BA30-CF41-84E1-EC9AFB48EBE4}" type="datetimeFigureOut">
               <a:rPr lang="it-IT" smtClean="0"/>
-              <a:t>16/12/23</a:t>
+              <a:t>22/12/23</a:t>
             </a:fld>
             <a:endParaRPr lang="it-IT" dirty="0"/>
           </a:p>
@@ -13887,7 +13892,12 @@
             <p:ph idx="1"/>
           </p:nvPr>
         </p:nvSpPr>
-        <p:spPr/>
+        <p:spPr>
+          <a:xfrm>
+            <a:off x="1683170" y="3662279"/>
+            <a:ext cx="8825659" cy="1078163"/>
+          </a:xfrm>
+        </p:spPr>
         <p:txBody>
           <a:bodyPr/>
           <a:lstStyle/>

</xml_diff>